<commit_message>
Amended chart headings and presentation
</commit_message>
<xml_diff>
--- a/Module 7 - Project 1 - Group 7 Presentation.pptx
+++ b/Module 7 - Project 1 - Group 7 Presentation.pptx
@@ -265,7 +265,7 @@
           <a:p>
             <a:fld id="{2BB6C517-F993-41E5-883A-C4F55F1255BC}" type="datetimeFigureOut">
               <a:rPr lang="en-AU" smtClean="0"/>
-              <a:t>19/7/2023</a:t>
+              <a:t>20/7/2023</a:t>
             </a:fld>
             <a:endParaRPr lang="en-AU"/>
           </a:p>
@@ -465,7 +465,7 @@
           <a:p>
             <a:fld id="{2BB6C517-F993-41E5-883A-C4F55F1255BC}" type="datetimeFigureOut">
               <a:rPr lang="en-AU" smtClean="0"/>
-              <a:t>19/7/2023</a:t>
+              <a:t>20/7/2023</a:t>
             </a:fld>
             <a:endParaRPr lang="en-AU"/>
           </a:p>
@@ -675,7 +675,7 @@
           <a:p>
             <a:fld id="{2BB6C517-F993-41E5-883A-C4F55F1255BC}" type="datetimeFigureOut">
               <a:rPr lang="en-AU" smtClean="0"/>
-              <a:t>19/7/2023</a:t>
+              <a:t>20/7/2023</a:t>
             </a:fld>
             <a:endParaRPr lang="en-AU"/>
           </a:p>
@@ -875,7 +875,7 @@
           <a:p>
             <a:fld id="{2BB6C517-F993-41E5-883A-C4F55F1255BC}" type="datetimeFigureOut">
               <a:rPr lang="en-AU" smtClean="0"/>
-              <a:t>19/7/2023</a:t>
+              <a:t>20/7/2023</a:t>
             </a:fld>
             <a:endParaRPr lang="en-AU"/>
           </a:p>
@@ -1151,7 +1151,7 @@
           <a:p>
             <a:fld id="{2BB6C517-F993-41E5-883A-C4F55F1255BC}" type="datetimeFigureOut">
               <a:rPr lang="en-AU" smtClean="0"/>
-              <a:t>19/7/2023</a:t>
+              <a:t>20/7/2023</a:t>
             </a:fld>
             <a:endParaRPr lang="en-AU"/>
           </a:p>
@@ -1419,7 +1419,7 @@
           <a:p>
             <a:fld id="{2BB6C517-F993-41E5-883A-C4F55F1255BC}" type="datetimeFigureOut">
               <a:rPr lang="en-AU" smtClean="0"/>
-              <a:t>19/7/2023</a:t>
+              <a:t>20/7/2023</a:t>
             </a:fld>
             <a:endParaRPr lang="en-AU"/>
           </a:p>
@@ -1834,7 +1834,7 @@
           <a:p>
             <a:fld id="{2BB6C517-F993-41E5-883A-C4F55F1255BC}" type="datetimeFigureOut">
               <a:rPr lang="en-AU" smtClean="0"/>
-              <a:t>19/7/2023</a:t>
+              <a:t>20/7/2023</a:t>
             </a:fld>
             <a:endParaRPr lang="en-AU"/>
           </a:p>
@@ -1976,7 +1976,7 @@
           <a:p>
             <a:fld id="{2BB6C517-F993-41E5-883A-C4F55F1255BC}" type="datetimeFigureOut">
               <a:rPr lang="en-AU" smtClean="0"/>
-              <a:t>19/7/2023</a:t>
+              <a:t>20/7/2023</a:t>
             </a:fld>
             <a:endParaRPr lang="en-AU"/>
           </a:p>
@@ -2089,7 +2089,7 @@
           <a:p>
             <a:fld id="{2BB6C517-F993-41E5-883A-C4F55F1255BC}" type="datetimeFigureOut">
               <a:rPr lang="en-AU" smtClean="0"/>
-              <a:t>19/7/2023</a:t>
+              <a:t>20/7/2023</a:t>
             </a:fld>
             <a:endParaRPr lang="en-AU"/>
           </a:p>
@@ -2402,7 +2402,7 @@
           <a:p>
             <a:fld id="{2BB6C517-F993-41E5-883A-C4F55F1255BC}" type="datetimeFigureOut">
               <a:rPr lang="en-AU" smtClean="0"/>
-              <a:t>19/7/2023</a:t>
+              <a:t>20/7/2023</a:t>
             </a:fld>
             <a:endParaRPr lang="en-AU"/>
           </a:p>
@@ -2691,7 +2691,7 @@
           <a:p>
             <a:fld id="{2BB6C517-F993-41E5-883A-C4F55F1255BC}" type="datetimeFigureOut">
               <a:rPr lang="en-AU" smtClean="0"/>
-              <a:t>19/7/2023</a:t>
+              <a:t>20/7/2023</a:t>
             </a:fld>
             <a:endParaRPr lang="en-AU"/>
           </a:p>
@@ -2934,7 +2934,7 @@
           <a:p>
             <a:fld id="{2BB6C517-F993-41E5-883A-C4F55F1255BC}" type="datetimeFigureOut">
               <a:rPr lang="en-AU" smtClean="0"/>
-              <a:t>19/7/2023</a:t>
+              <a:t>20/7/2023</a:t>
             </a:fld>
             <a:endParaRPr lang="en-AU"/>
           </a:p>
@@ -3619,7 +3619,7 @@
         <p:spPr>
           <a:xfrm>
             <a:off x="223935" y="1268963"/>
-            <a:ext cx="4142792" cy="5262979"/>
+            <a:ext cx="4142792" cy="5478423"/>
           </a:xfrm>
           <a:prstGeom prst="rect">
             <a:avLst/>
@@ -3714,16 +3714,6 @@
             </a:endParaRPr>
           </a:p>
           <a:p>
-            <a:pPr marL="285750" indent="-285750">
-              <a:buFontTx/>
-              <a:buChar char="-"/>
-            </a:pPr>
-            <a:endParaRPr lang="en-AU" sz="1400" dirty="0">
-              <a:latin typeface="Arial" panose="020B0604020202020204" pitchFamily="34" charset="0"/>
-              <a:cs typeface="Arial" panose="020B0604020202020204" pitchFamily="34" charset="0"/>
-            </a:endParaRPr>
-          </a:p>
-          <a:p>
             <a:r>
               <a:rPr lang="en-AU" sz="1400" b="1" dirty="0">
                 <a:latin typeface="Arial" panose="020B0604020202020204" pitchFamily="34" charset="0"/>
@@ -3765,6 +3755,19 @@
                 <a:cs typeface="Arial" panose="020B0604020202020204" pitchFamily="34" charset="0"/>
               </a:rPr>
               <a:t>United States Census Bureau</a:t>
+            </a:r>
+          </a:p>
+          <a:p>
+            <a:pPr marL="285750" indent="-285750">
+              <a:buFontTx/>
+              <a:buChar char="-"/>
+            </a:pPr>
+            <a:r>
+              <a:rPr lang="en-AU" sz="1400" dirty="0">
+                <a:latin typeface="Arial" panose="020B0604020202020204" pitchFamily="34" charset="0"/>
+                <a:cs typeface="Arial" panose="020B0604020202020204" pitchFamily="34" charset="0"/>
+              </a:rPr>
+              <a:t>US Department of Transportation – Federal Highway Administration</a:t>
             </a:r>
           </a:p>
           <a:p>
@@ -4241,7 +4244,7 @@
                 <a:latin typeface="Arial" panose="020B0604020202020204" pitchFamily="34" charset="0"/>
                 <a:cs typeface="Arial" panose="020B0604020202020204" pitchFamily="34" charset="0"/>
               </a:rPr>
-              <a:t>Spend by individual States is strongly correlated to estimated population (as at 2021), with Texas estimate spend being moderately higher than other states.</a:t>
+              <a:t>Spend by individual States is strongly correlated to estimated population (as at 2021), with Texas estimated spend being moderately higher than other states.</a:t>
             </a:r>
             <a:endParaRPr lang="en-AU" sz="1400" b="1" dirty="0">
               <a:latin typeface="Arial" panose="020B0604020202020204" pitchFamily="34" charset="0"/>
@@ -4618,7 +4621,7 @@
                 <a:latin typeface="Arial" panose="020B0604020202020204" pitchFamily="34" charset="0"/>
                 <a:cs typeface="Arial" panose="020B0604020202020204" pitchFamily="34" charset="0"/>
               </a:rPr>
-              <a:t>Notably, California has a very high average registration per capital (100,000 population) when compared to other States. </a:t>
+              <a:t>Notably, California has a very high average registration per capita (100,000 population) when compared to other States. </a:t>
             </a:r>
           </a:p>
           <a:p>
@@ -5061,7 +5064,7 @@
         <p:spPr>
           <a:xfrm>
             <a:off x="262137" y="1410079"/>
-            <a:ext cx="4142792" cy="3416320"/>
+            <a:ext cx="4142792" cy="3231654"/>
           </a:xfrm>
           <a:prstGeom prst="rect">
             <a:avLst/>
@@ -5079,7 +5082,7 @@
                 <a:latin typeface="Arial" panose="020B0604020202020204" pitchFamily="34" charset="0"/>
                 <a:cs typeface="Arial" panose="020B0604020202020204" pitchFamily="34" charset="0"/>
               </a:rPr>
-              <a:t>The the total number EV charge outlets  strongly correlates with the total number of EV registrations in each State.</a:t>
+              <a:t>The total number EV charging outlets strongly correlates with the total number of EV registrations in each State.</a:t>
             </a:r>
           </a:p>
           <a:p>
@@ -5114,7 +5117,7 @@
                 <a:latin typeface="Arial" panose="020B0604020202020204" pitchFamily="34" charset="0"/>
                 <a:cs typeface="Arial" panose="020B0604020202020204" pitchFamily="34" charset="0"/>
               </a:rPr>
-              <a:t>Texas which also has a large population however currently provides notably fewer charging outlets per capita in comparison.</a:t>
+              <a:t>Texas which also has a large population currently provides notably fewer charging outlets per capita in comparison.</a:t>
             </a:r>
           </a:p>
           <a:p>
@@ -5236,10 +5239,10 @@
       </p:pic>
       <p:pic>
         <p:nvPicPr>
-          <p:cNvPr id="3" name="Picture 2" descr="A graph with a red line and blue dots&#10;&#10;Description automatically generated">
-            <a:extLst>
-              <a:ext uri="{FF2B5EF4-FFF2-40B4-BE49-F238E27FC236}">
-                <a16:creationId xmlns:a16="http://schemas.microsoft.com/office/drawing/2014/main" id="{A8C6C350-C29E-E7F8-CA3C-A3A671224A84}"/>
+          <p:cNvPr id="7" name="Picture 6" descr="A graph with a red line and a red line&#10;&#10;Description automatically generated">
+            <a:extLst>
+              <a:ext uri="{FF2B5EF4-FFF2-40B4-BE49-F238E27FC236}">
+                <a16:creationId xmlns:a16="http://schemas.microsoft.com/office/drawing/2014/main" id="{EA222202-5440-D8ED-9CAD-8AAF76CA91F0}"/>
               </a:ext>
             </a:extLst>
           </p:cNvPr>
@@ -5250,78 +5253,6 @@
         </p:nvPicPr>
         <p:blipFill>
           <a:blip r:embed="rId4">
-            <a:extLst>
-              <a:ext uri="{28A0092B-C50C-407E-A947-70E740481C1C}">
-                <a14:useLocalDpi xmlns:a14="http://schemas.microsoft.com/office/drawing/2010/main" val="0"/>
-              </a:ext>
-            </a:extLst>
-          </a:blip>
-          <a:stretch>
-            <a:fillRect/>
-          </a:stretch>
-        </p:blipFill>
-        <p:spPr>
-          <a:xfrm>
-            <a:off x="5092067" y="3901965"/>
-            <a:ext cx="3115000" cy="2340000"/>
-          </a:xfrm>
-          <a:prstGeom prst="rect">
-            <a:avLst/>
-          </a:prstGeom>
-        </p:spPr>
-      </p:pic>
-      <p:pic>
-        <p:nvPicPr>
-          <p:cNvPr id="8" name="Picture 7" descr="A graph of electric vehicles&#10;&#10;Description automatically generated">
-            <a:extLst>
-              <a:ext uri="{FF2B5EF4-FFF2-40B4-BE49-F238E27FC236}">
-                <a16:creationId xmlns:a16="http://schemas.microsoft.com/office/drawing/2014/main" id="{569D9519-F13F-BF07-524C-F33B9CE972EF}"/>
-              </a:ext>
-            </a:extLst>
-          </p:cNvPr>
-          <p:cNvPicPr>
-            <a:picLocks noChangeAspect="1"/>
-          </p:cNvPicPr>
-          <p:nvPr/>
-        </p:nvPicPr>
-        <p:blipFill>
-          <a:blip r:embed="rId5">
-            <a:extLst>
-              <a:ext uri="{28A0092B-C50C-407E-A947-70E740481C1C}">
-                <a14:useLocalDpi xmlns:a14="http://schemas.microsoft.com/office/drawing/2010/main" val="0"/>
-              </a:ext>
-            </a:extLst>
-          </a:blip>
-          <a:stretch>
-            <a:fillRect/>
-          </a:stretch>
-        </p:blipFill>
-        <p:spPr>
-          <a:xfrm>
-            <a:off x="5092067" y="1289501"/>
-            <a:ext cx="3115000" cy="2340000"/>
-          </a:xfrm>
-          <a:prstGeom prst="rect">
-            <a:avLst/>
-          </a:prstGeom>
-        </p:spPr>
-      </p:pic>
-      <p:pic>
-        <p:nvPicPr>
-          <p:cNvPr id="7" name="Picture 6" descr="A graph with a red line and a red line&#10;&#10;Description automatically generated">
-            <a:extLst>
-              <a:ext uri="{FF2B5EF4-FFF2-40B4-BE49-F238E27FC236}">
-                <a16:creationId xmlns:a16="http://schemas.microsoft.com/office/drawing/2014/main" id="{EA222202-5440-D8ED-9CAD-8AAF76CA91F0}"/>
-              </a:ext>
-            </a:extLst>
-          </p:cNvPr>
-          <p:cNvPicPr>
-            <a:picLocks noChangeAspect="1"/>
-          </p:cNvPicPr>
-          <p:nvPr/>
-        </p:nvPicPr>
-        <p:blipFill>
-          <a:blip r:embed="rId6">
             <a:extLst>
               <a:ext uri="{28A0092B-C50C-407E-A947-70E740481C1C}">
                 <a14:useLocalDpi xmlns:a14="http://schemas.microsoft.com/office/drawing/2010/main" val="0"/>
@@ -5347,6 +5278,78 @@
               </a:schemeClr>
             </a:solidFill>
           </a:ln>
+        </p:spPr>
+      </p:pic>
+      <p:pic>
+        <p:nvPicPr>
+          <p:cNvPr id="9" name="Picture 8" descr="A graph with a red line and blue dots&#10;&#10;Description automatically generated">
+            <a:extLst>
+              <a:ext uri="{FF2B5EF4-FFF2-40B4-BE49-F238E27FC236}">
+                <a16:creationId xmlns:a16="http://schemas.microsoft.com/office/drawing/2014/main" id="{8F277E2E-1BC9-10C5-4EF3-24E18274B2C6}"/>
+              </a:ext>
+            </a:extLst>
+          </p:cNvPr>
+          <p:cNvPicPr>
+            <a:picLocks noChangeAspect="1"/>
+          </p:cNvPicPr>
+          <p:nvPr/>
+        </p:nvPicPr>
+        <p:blipFill>
+          <a:blip r:embed="rId5">
+            <a:extLst>
+              <a:ext uri="{28A0092B-C50C-407E-A947-70E740481C1C}">
+                <a14:useLocalDpi xmlns:a14="http://schemas.microsoft.com/office/drawing/2010/main" val="0"/>
+              </a:ext>
+            </a:extLst>
+          </a:blip>
+          <a:stretch>
+            <a:fillRect/>
+          </a:stretch>
+        </p:blipFill>
+        <p:spPr>
+          <a:xfrm>
+            <a:off x="5092067" y="3896604"/>
+            <a:ext cx="3115000" cy="2340000"/>
+          </a:xfrm>
+          <a:prstGeom prst="rect">
+            <a:avLst/>
+          </a:prstGeom>
+        </p:spPr>
+      </p:pic>
+      <p:pic>
+        <p:nvPicPr>
+          <p:cNvPr id="11" name="Picture 10" descr="A graph with different colored rectangles&#10;&#10;Description automatically generated">
+            <a:extLst>
+              <a:ext uri="{FF2B5EF4-FFF2-40B4-BE49-F238E27FC236}">
+                <a16:creationId xmlns:a16="http://schemas.microsoft.com/office/drawing/2014/main" id="{87CCFE65-CBA3-E8B2-AC74-9B02D963DF42}"/>
+              </a:ext>
+            </a:extLst>
+          </p:cNvPr>
+          <p:cNvPicPr>
+            <a:picLocks noChangeAspect="1"/>
+          </p:cNvPicPr>
+          <p:nvPr/>
+        </p:nvPicPr>
+        <p:blipFill>
+          <a:blip r:embed="rId6">
+            <a:extLst>
+              <a:ext uri="{28A0092B-C50C-407E-A947-70E740481C1C}">
+                <a14:useLocalDpi xmlns:a14="http://schemas.microsoft.com/office/drawing/2010/main" val="0"/>
+              </a:ext>
+            </a:extLst>
+          </a:blip>
+          <a:stretch>
+            <a:fillRect/>
+          </a:stretch>
+        </p:blipFill>
+        <p:spPr>
+          <a:xfrm>
+            <a:off x="5092067" y="1289501"/>
+            <a:ext cx="3115000" cy="2340000"/>
+          </a:xfrm>
+          <a:prstGeom prst="rect">
+            <a:avLst/>
+          </a:prstGeom>
         </p:spPr>
       </p:pic>
     </p:spTree>
@@ -5592,7 +5595,7 @@
                 <a:latin typeface="Arial" panose="020B0604020202020204" pitchFamily="34" charset="0"/>
                 <a:cs typeface="Arial" panose="020B0604020202020204" pitchFamily="34" charset="0"/>
               </a:rPr>
-              <a:t>The data demonstrates that California has an established EV market with considerable existing EV infrastructure and that it is continuing to invest significant funding into the future.  </a:t>
+              <a:t>Based on the limited exploration of the subject matter, we consider there may be opportunity to establish a successful EV dealership in California or Texas.</a:t>
             </a:r>
           </a:p>
           <a:p>
@@ -5607,7 +5610,7 @@
                 <a:latin typeface="Arial" panose="020B0604020202020204" pitchFamily="34" charset="0"/>
                 <a:cs typeface="Arial" panose="020B0604020202020204" pitchFamily="34" charset="0"/>
               </a:rPr>
-              <a:t>By comparison, Texas currently has a relatively small EV market however is investing significant funding towards EV infrastructure presumably in anticipation of considerable growth in the coming years. </a:t>
+              <a:t>The data analysed demonstrates that California has an established EV market with considerable existing EV infrastructure and that it is continuing to invest considerable funding into the future.  </a:t>
             </a:r>
           </a:p>
           <a:p>
@@ -5622,7 +5625,7 @@
                 <a:latin typeface="Arial" panose="020B0604020202020204" pitchFamily="34" charset="0"/>
                 <a:cs typeface="Arial" panose="020B0604020202020204" pitchFamily="34" charset="0"/>
               </a:rPr>
-              <a:t>Based on the limited exploration of the subject matter, we consider there may be opportunity to establish a successful EV dealership in California or Texas.</a:t>
+              <a:t>In comparison, Texas currently has a relatively smaller EV market and is investing significant funding towards EV infrastructure presumably in anticipation of considerable growth in the coming years. </a:t>
             </a:r>
           </a:p>
           <a:p>

</xml_diff>